<commit_message>
corrections/improvements to several slides
</commit_message>
<xml_diff>
--- a/PowerPoints/07 - Error Handling.pptx
+++ b/PowerPoints/07 - Error Handling.pptx
@@ -1,6 +1,6 @@
 
 <file path=ppt/presentation.xml><?xml version="1.0" encoding="utf-8"?>
-<p:presentation xmlns:a="http://schemas.openxmlformats.org/drawingml/2006/main" xmlns:r="http://schemas.openxmlformats.org/officeDocument/2006/relationships" xmlns:p="http://schemas.openxmlformats.org/presentationml/2006/main" saveSubsetFonts="1">
+<p:presentation xmlns:a="http://schemas.openxmlformats.org/drawingml/2006/main" xmlns:r="http://schemas.openxmlformats.org/officeDocument/2006/relationships" xmlns:p="http://schemas.openxmlformats.org/presentationml/2006/main" saveSubsetFonts="1" autoCompressPictures="0">
   <p:sldMasterIdLst>
     <p:sldMasterId id="2147483651" r:id="rId1"/>
   </p:sldMasterIdLst>
@@ -28,7 +28,7 @@
     <p:sldId id="297" r:id="rId16"/>
     <p:sldId id="294" r:id="rId17"/>
     <p:sldId id="357" r:id="rId18"/>
-    <p:sldId id="356" r:id="rId19"/>
+    <p:sldId id="359" r:id="rId19"/>
     <p:sldId id="355" r:id="rId20"/>
     <p:sldId id="285" r:id="rId21"/>
     <p:sldId id="350" r:id="rId22"/>
@@ -38,7 +38,7 @@
     <p:sldId id="291" r:id="rId26"/>
   </p:sldIdLst>
   <p:sldSz cx="9144000" cy="6858000" type="screen4x3"/>
-  <p:notesSz cx="7010400" cy="9296400"/>
+  <p:notesSz cx="7315200" cy="9601200"/>
   <p:defaultTextStyle>
     <a:defPPr>
       <a:defRPr lang="en-US"/>
@@ -181,12 +181,12 @@
     </p:ext>
     <p:ext uri="{2D200454-40CA-4A62-9FC3-DE9A4176ACB9}">
       <p15:notesGuideLst xmlns:p15="http://schemas.microsoft.com/office/powerpoint/2012/main">
-        <p15:guide id="1" orient="horz" pos="2928">
+        <p15:guide id="1" orient="horz" pos="3024" userDrawn="1">
           <p15:clr>
             <a:srgbClr val="A4A3A4"/>
           </p15:clr>
         </p15:guide>
-        <p15:guide id="2" pos="2208">
+        <p15:guide id="2" pos="2304" userDrawn="1">
           <p15:clr>
             <a:srgbClr val="A4A3A4"/>
           </p15:clr>
@@ -234,8 +234,8 @@
         </p:nvSpPr>
         <p:spPr bwMode="auto">
           <a:xfrm>
-            <a:off x="3971925" y="0"/>
-            <a:ext cx="3038475" cy="465138"/>
+            <a:off x="4144618" y="0"/>
+            <a:ext cx="3170583" cy="480388"/>
           </a:xfrm>
           <a:prstGeom prst="rect">
             <a:avLst/>
@@ -250,13 +250,13 @@
           <a:effectLst/>
         </p:spPr>
         <p:txBody>
-          <a:bodyPr vert="horz" wrap="square" lIns="93177" tIns="46589" rIns="93177" bIns="46589" numCol="1" anchor="t" anchorCtr="0" compatLnSpc="1">
+          <a:bodyPr vert="horz" wrap="square" lIns="96653" tIns="48327" rIns="96653" bIns="48327" numCol="1" anchor="t" anchorCtr="0" compatLnSpc="1">
             <a:prstTxWarp prst="textNoShape">
               <a:avLst/>
             </a:prstTxWarp>
           </a:bodyPr>
           <a:lstStyle>
-            <a:lvl1pPr algn="r" defTabSz="931863">
+            <a:lvl1pPr algn="r" defTabSz="966621">
               <a:defRPr sz="1200"/>
             </a:lvl1pPr>
           </a:lstStyle>
@@ -285,8 +285,8 @@
         </p:nvSpPr>
         <p:spPr bwMode="auto">
           <a:xfrm>
-            <a:off x="3971925" y="8831263"/>
-            <a:ext cx="3038475" cy="465137"/>
+            <a:off x="4144618" y="9120813"/>
+            <a:ext cx="3170583" cy="480387"/>
           </a:xfrm>
           <a:prstGeom prst="rect">
             <a:avLst/>
@@ -301,13 +301,13 @@
           <a:effectLst/>
         </p:spPr>
         <p:txBody>
-          <a:bodyPr vert="horz" wrap="square" lIns="93177" tIns="46589" rIns="93177" bIns="46589" numCol="1" anchor="b" anchorCtr="0" compatLnSpc="1">
+          <a:bodyPr vert="horz" wrap="square" lIns="96653" tIns="48327" rIns="96653" bIns="48327" numCol="1" anchor="b" anchorCtr="0" compatLnSpc="1">
             <a:prstTxWarp prst="textNoShape">
               <a:avLst/>
             </a:prstTxWarp>
           </a:bodyPr>
           <a:lstStyle>
-            <a:lvl1pPr algn="r" defTabSz="931863">
+            <a:lvl1pPr algn="r" defTabSz="966621">
               <a:defRPr sz="1200"/>
             </a:lvl1pPr>
           </a:lstStyle>
@@ -385,7 +385,7 @@
         <p:spPr bwMode="auto">
           <a:xfrm>
             <a:off x="0" y="0"/>
-            <a:ext cx="3038475" cy="465138"/>
+            <a:ext cx="3170583" cy="480388"/>
           </a:xfrm>
           <a:prstGeom prst="rect">
             <a:avLst/>
@@ -400,13 +400,13 @@
           <a:effectLst/>
         </p:spPr>
         <p:txBody>
-          <a:bodyPr vert="horz" wrap="square" lIns="93177" tIns="46589" rIns="93177" bIns="46589" numCol="1" anchor="t" anchorCtr="0" compatLnSpc="1">
+          <a:bodyPr vert="horz" wrap="square" lIns="96653" tIns="48327" rIns="96653" bIns="48327" numCol="1" anchor="t" anchorCtr="0" compatLnSpc="1">
             <a:prstTxWarp prst="textNoShape">
               <a:avLst/>
             </a:prstTxWarp>
           </a:bodyPr>
           <a:lstStyle>
-            <a:lvl1pPr algn="l" defTabSz="931863">
+            <a:lvl1pPr algn="l" defTabSz="966621">
               <a:defRPr sz="1200"/>
             </a:lvl1pPr>
           </a:lstStyle>
@@ -433,8 +433,8 @@
         </p:nvSpPr>
         <p:spPr bwMode="auto">
           <a:xfrm>
-            <a:off x="3971925" y="0"/>
-            <a:ext cx="3038475" cy="465138"/>
+            <a:off x="4144618" y="0"/>
+            <a:ext cx="3170583" cy="480388"/>
           </a:xfrm>
           <a:prstGeom prst="rect">
             <a:avLst/>
@@ -449,13 +449,13 @@
           <a:effectLst/>
         </p:spPr>
         <p:txBody>
-          <a:bodyPr vert="horz" wrap="square" lIns="93177" tIns="46589" rIns="93177" bIns="46589" numCol="1" anchor="t" anchorCtr="0" compatLnSpc="1">
+          <a:bodyPr vert="horz" wrap="square" lIns="96653" tIns="48327" rIns="96653" bIns="48327" numCol="1" anchor="t" anchorCtr="0" compatLnSpc="1">
             <a:prstTxWarp prst="textNoShape">
               <a:avLst/>
             </a:prstTxWarp>
           </a:bodyPr>
           <a:lstStyle>
-            <a:lvl1pPr algn="r" defTabSz="931863">
+            <a:lvl1pPr algn="r" defTabSz="966621">
               <a:defRPr sz="1200"/>
             </a:lvl1pPr>
           </a:lstStyle>
@@ -479,8 +479,8 @@
         </p:nvSpPr>
         <p:spPr bwMode="auto">
           <a:xfrm>
-            <a:off x="1181100" y="696913"/>
-            <a:ext cx="4648200" cy="3486150"/>
+            <a:off x="1257300" y="719138"/>
+            <a:ext cx="4800600" cy="3600450"/>
           </a:xfrm>
           <a:prstGeom prst="rect">
             <a:avLst/>
@@ -508,8 +508,8 @@
         </p:nvSpPr>
         <p:spPr bwMode="auto">
           <a:xfrm>
-            <a:off x="935038" y="4416425"/>
-            <a:ext cx="5140325" cy="4183063"/>
+            <a:off x="975693" y="4561226"/>
+            <a:ext cx="5363817" cy="4320213"/>
           </a:xfrm>
           <a:prstGeom prst="rect">
             <a:avLst/>
@@ -524,7 +524,7 @@
           <a:effectLst/>
         </p:spPr>
         <p:txBody>
-          <a:bodyPr vert="horz" wrap="square" lIns="93177" tIns="46589" rIns="93177" bIns="46589" numCol="1" anchor="t" anchorCtr="0" compatLnSpc="1">
+          <a:bodyPr vert="horz" wrap="square" lIns="96653" tIns="48327" rIns="96653" bIns="48327" numCol="1" anchor="t" anchorCtr="0" compatLnSpc="1">
             <a:prstTxWarp prst="textNoShape">
               <a:avLst/>
             </a:prstTxWarp>
@@ -579,8 +579,8 @@
         </p:nvSpPr>
         <p:spPr bwMode="auto">
           <a:xfrm>
-            <a:off x="0" y="8831263"/>
-            <a:ext cx="3038475" cy="465137"/>
+            <a:off x="0" y="9120813"/>
+            <a:ext cx="3170583" cy="480387"/>
           </a:xfrm>
           <a:prstGeom prst="rect">
             <a:avLst/>
@@ -595,13 +595,13 @@
           <a:effectLst/>
         </p:spPr>
         <p:txBody>
-          <a:bodyPr vert="horz" wrap="square" lIns="93177" tIns="46589" rIns="93177" bIns="46589" numCol="1" anchor="b" anchorCtr="0" compatLnSpc="1">
+          <a:bodyPr vert="horz" wrap="square" lIns="96653" tIns="48327" rIns="96653" bIns="48327" numCol="1" anchor="b" anchorCtr="0" compatLnSpc="1">
             <a:prstTxWarp prst="textNoShape">
               <a:avLst/>
             </a:prstTxWarp>
           </a:bodyPr>
           <a:lstStyle>
-            <a:lvl1pPr algn="l" defTabSz="931863">
+            <a:lvl1pPr algn="l" defTabSz="966621">
               <a:defRPr sz="1200"/>
             </a:lvl1pPr>
           </a:lstStyle>
@@ -625,8 +625,8 @@
         </p:nvSpPr>
         <p:spPr bwMode="auto">
           <a:xfrm>
-            <a:off x="3971925" y="8831263"/>
-            <a:ext cx="3038475" cy="465137"/>
+            <a:off x="4144618" y="9120813"/>
+            <a:ext cx="3170583" cy="480387"/>
           </a:xfrm>
           <a:prstGeom prst="rect">
             <a:avLst/>
@@ -641,13 +641,13 @@
           <a:effectLst/>
         </p:spPr>
         <p:txBody>
-          <a:bodyPr vert="horz" wrap="square" lIns="93177" tIns="46589" rIns="93177" bIns="46589" numCol="1" anchor="b" anchorCtr="0" compatLnSpc="1">
+          <a:bodyPr vert="horz" wrap="square" lIns="96653" tIns="48327" rIns="96653" bIns="48327" numCol="1" anchor="b" anchorCtr="0" compatLnSpc="1">
             <a:prstTxWarp prst="textNoShape">
               <a:avLst/>
             </a:prstTxWarp>
           </a:bodyPr>
           <a:lstStyle>
-            <a:lvl1pPr algn="r" defTabSz="931863">
+            <a:lvl1pPr algn="r" defTabSz="966621">
               <a:defRPr sz="1200"/>
             </a:lvl1pPr>
           </a:lstStyle>
@@ -5288,7 +5288,7 @@
               <a:rPr lang="en-US" sz="1800" dirty="0">
                 <a:latin typeface="Consolas" panose="020B0609020204030204" pitchFamily="49" charset="0"/>
               </a:rPr>
-              <a:t> {"proc", "fun", EOF}</a:t>
+              <a:t> { "proc", "fun", EOF }</a:t>
             </a:r>
           </a:p>
           <a:p>
@@ -5809,21 +5809,7 @@
                 <a:latin typeface="Consolas" pitchFamily="49" charset="0"/>
                 <a:cs typeface="Consolas" pitchFamily="49" charset="0"/>
               </a:rPr>
-              <a:t> = </a:t>
-            </a:r>
-            <a:r>
-              <a:rPr lang="en-US" sz="1800" dirty="0" err="1">
-                <a:latin typeface="Consolas" pitchFamily="49" charset="0"/>
-                <a:cs typeface="Consolas" pitchFamily="49" charset="0"/>
-              </a:rPr>
-              <a:t>EnumSet.of</a:t>
-            </a:r>
-            <a:r>
-              <a:rPr lang="en-US" sz="1800" dirty="0">
-                <a:latin typeface="Consolas" pitchFamily="49" charset="0"/>
-                <a:cs typeface="Consolas" pitchFamily="49" charset="0"/>
-              </a:rPr>
-              <a:t>(</a:t>
+              <a:t> =</a:t>
             </a:r>
           </a:p>
           <a:p>
@@ -5835,7 +5821,21 @@
                 <a:latin typeface="Consolas" pitchFamily="49" charset="0"/>
                 <a:cs typeface="Consolas" pitchFamily="49" charset="0"/>
               </a:rPr>
-              <a:t>    </a:t>
+              <a:t>        </a:t>
+            </a:r>
+            <a:r>
+              <a:rPr lang="en-US" sz="1800" dirty="0" err="1">
+                <a:latin typeface="Consolas" pitchFamily="49" charset="0"/>
+                <a:cs typeface="Consolas" pitchFamily="49" charset="0"/>
+              </a:rPr>
+              <a:t>EnumSet.of</a:t>
+            </a:r>
+            <a:r>
+              <a:rPr lang="en-US" sz="1800" dirty="0">
+                <a:latin typeface="Consolas" pitchFamily="49" charset="0"/>
+                <a:cs typeface="Consolas" pitchFamily="49" charset="0"/>
+              </a:rPr>
+              <a:t>(</a:t>
             </a:r>
             <a:r>
               <a:rPr lang="en-US" sz="1800" dirty="0" err="1">
@@ -6872,13 +6872,14 @@
           <a:p>
             <a:r>
               <a:rPr lang="en-US" dirty="0"/>
-              <a:t>Since the most common identifier-related error is to declare or reference an identifier incorrectly, we will assume that this is the case and advance to the next semicolon before implementing error recovery.</a:t>
-            </a:r>
-          </a:p>
-          <a:p>
-            <a:r>
-              <a:rPr lang="en-US" dirty="0"/>
-              <a:t>The goal is that by advancing to the next semicolon, we hopefully move the scanner to the end of the erroneous statement.</a:t>
+              <a:t>Since the most common identifier-related error is to declare or reference an identifier incorrectly, we will assume that this is the case and advance to the end of the current statement before implementing error recovery.</a:t>
+            </a:r>
+          </a:p>
+          <a:p>
+            <a:pPr lvl="1"/>
+            <a:r>
+              <a:rPr lang="en-US" dirty="0"/>
+              <a:t>The end of the current statement will be either a semicolon or (for a compound statement) a right brace.</a:t>
             </a:r>
           </a:p>
         </p:txBody>
@@ -7156,7 +7157,57 @@
               <a:rPr lang="en-US" sz="1800" b="1" dirty="0">
                 <a:latin typeface="Consolas" panose="020B0609020204030204" pitchFamily="49" charset="0"/>
               </a:rPr>
-              <a:t>    scanner.advanceTo(Symbol.semicolon);</a:t>
+              <a:t>    </a:t>
+            </a:r>
+            <a:r>
+              <a:rPr lang="en-US" sz="1800" b="1" dirty="0" err="1">
+                <a:latin typeface="Consolas" panose="020B0609020204030204" pitchFamily="49" charset="0"/>
+              </a:rPr>
+              <a:t>scanner.advanceTo</a:t>
+            </a:r>
+            <a:r>
+              <a:rPr lang="en-US" sz="1800" b="1" dirty="0">
+                <a:latin typeface="Consolas" panose="020B0609020204030204" pitchFamily="49" charset="0"/>
+              </a:rPr>
+              <a:t>(</a:t>
+            </a:r>
+          </a:p>
+          <a:p>
+            <a:pPr marL="274320" indent="0">
+              <a:spcBef>
+                <a:spcPts val="200"/>
+              </a:spcBef>
+              <a:buNone/>
+            </a:pPr>
+            <a:r>
+              <a:rPr lang="en-US" sz="1800" b="1" dirty="0">
+                <a:latin typeface="Consolas" panose="020B0609020204030204" pitchFamily="49" charset="0"/>
+              </a:rPr>
+              <a:t>            </a:t>
+            </a:r>
+            <a:r>
+              <a:rPr lang="en-US" sz="1800" b="1" dirty="0" err="1">
+                <a:latin typeface="Consolas" panose="020B0609020204030204" pitchFamily="49" charset="0"/>
+              </a:rPr>
+              <a:t>EnumSet.of</a:t>
+            </a:r>
+            <a:r>
+              <a:rPr lang="en-US" sz="1800" b="1" dirty="0">
+                <a:latin typeface="Consolas" panose="020B0609020204030204" pitchFamily="49" charset="0"/>
+              </a:rPr>
+              <a:t>(Symbol.semicolon, </a:t>
+            </a:r>
+            <a:r>
+              <a:rPr lang="en-US" sz="1800" b="1" dirty="0" err="1">
+                <a:latin typeface="Consolas" panose="020B0609020204030204" pitchFamily="49" charset="0"/>
+              </a:rPr>
+              <a:t>Symbol.rightBrace</a:t>
+            </a:r>
+            <a:r>
+              <a:rPr lang="en-US" sz="1800" b="1" dirty="0">
+                <a:latin typeface="Consolas" panose="020B0609020204030204" pitchFamily="49" charset="0"/>
+              </a:rPr>
+              <a:t>));</a:t>
             </a:r>
           </a:p>
           <a:p>
@@ -7265,7 +7316,7 @@
         </p:nvSpPr>
         <p:spPr>
           <a:xfrm>
-            <a:off x="3514913" y="4387790"/>
+            <a:off x="3514913" y="4705290"/>
             <a:ext cx="3558987" cy="400110"/>
           </a:xfrm>
           <a:prstGeom prst="rect">
@@ -7305,7 +7356,7 @@
         </p:nvSpPr>
         <p:spPr bwMode="auto">
           <a:xfrm>
-            <a:off x="2971800" y="3962400"/>
+            <a:off x="2971800" y="4279900"/>
             <a:ext cx="182880" cy="182880"/>
           </a:xfrm>
           <a:prstGeom prst="diamond">
@@ -7376,7 +7427,7 @@
         </p:nvCxnSpPr>
         <p:spPr bwMode="auto">
           <a:xfrm rot="10800000">
-            <a:off x="3063241" y="4145281"/>
+            <a:off x="3063241" y="4462781"/>
             <a:ext cx="451673" cy="442565"/>
           </a:xfrm>
           <a:prstGeom prst="bentConnector2">
@@ -7471,13 +7522,19 @@
           <a:p>
             <a:r>
               <a:rPr lang="en-US" dirty="0"/>
-              <a:t>From the rule </a:t>
+              <a:t>From the rule</a:t>
             </a:r>
           </a:p>
           <a:p>
             <a:pPr marL="457200" lvl="1" indent="0">
               <a:buNone/>
             </a:pPr>
+            <a:r>
+              <a:rPr lang="en-US" dirty="0">
+                <a:latin typeface="Consolas" panose="020B0609020204030204" pitchFamily="49" charset="0"/>
+              </a:rPr>
+              <a:t> </a:t>
+            </a:r>
             <a:r>
               <a:rPr lang="en-US" dirty="0" err="1">
                 <a:latin typeface="Consolas" panose="020B0609020204030204" pitchFamily="49" charset="0"/>
@@ -7582,99 +7639,14 @@
           <a:p>
             <a:r>
               <a:rPr lang="en-US" dirty="0"/>
-              <a:t>Two cases</a:t>
-            </a:r>
-          </a:p>
-          <a:p>
-            <a:pPr lvl="1"/>
-            <a:r>
-              <a:rPr lang="en-US" dirty="0"/>
-              <a:t>Case 1: </a:t>
-            </a:r>
-            <a:r>
-              <a:rPr lang="en-US" dirty="0" err="1">
-                <a:latin typeface="Consolas" panose="020B0609020204030204" pitchFamily="49" charset="0"/>
-              </a:rPr>
-              <a:t>initialDecl</a:t>
-            </a:r>
-            <a:r>
-              <a:rPr lang="en-US" dirty="0"/>
-              <a:t> appears as a global declaration</a:t>
-            </a:r>
-          </a:p>
-          <a:p>
-            <a:pPr lvl="2"/>
-            <a:r>
-              <a:rPr lang="en-US" dirty="0"/>
-              <a:t>can be followed by a subprogram</a:t>
-            </a:r>
-          </a:p>
-          <a:p>
-            <a:pPr lvl="2"/>
-            <a:r>
-              <a:rPr lang="en-US" dirty="0"/>
-              <a:t>follow set includes “</a:t>
-            </a:r>
-            <a:r>
-              <a:rPr lang="en-US" dirty="0">
-                <a:latin typeface="Consolas" panose="020B0609020204030204" pitchFamily="49" charset="0"/>
-              </a:rPr>
-              <a:t>proc</a:t>
-            </a:r>
-            <a:r>
-              <a:rPr lang="en-US" dirty="0"/>
-              <a:t>” and “</a:t>
-            </a:r>
-            <a:r>
-              <a:rPr lang="en-US" dirty="0">
-                <a:latin typeface="Consolas" panose="020B0609020204030204" pitchFamily="49" charset="0"/>
-              </a:rPr>
-              <a:t>fun</a:t>
-            </a:r>
-            <a:r>
-              <a:rPr lang="en-US" dirty="0"/>
-              <a:t>”</a:t>
-            </a:r>
-          </a:p>
-          <a:p>
-            <a:pPr lvl="1"/>
-            <a:r>
-              <a:rPr lang="en-US" dirty="0"/>
-              <a:t>Case 2: </a:t>
-            </a:r>
-            <a:r>
-              <a:rPr lang="en-US" dirty="0" err="1">
-                <a:latin typeface="Consolas" panose="020B0609020204030204" pitchFamily="49" charset="0"/>
-              </a:rPr>
-              <a:t>initialDecl</a:t>
-            </a:r>
-            <a:r>
-              <a:rPr lang="en-US" dirty="0"/>
-              <a:t> appears within a subprogram</a:t>
-            </a:r>
-          </a:p>
-          <a:p>
-            <a:pPr lvl="2"/>
-            <a:r>
-              <a:rPr lang="en-US" dirty="0"/>
-              <a:t>can be followed by zero or more statements</a:t>
-            </a:r>
-          </a:p>
-          <a:p>
-            <a:pPr lvl="2"/>
-            <a:r>
-              <a:rPr lang="en-US" dirty="0"/>
-              <a:t>follow set includes </a:t>
-            </a:r>
-            <a:r>
-              <a:rPr lang="en-US" dirty="0">
-                <a:latin typeface="Consolas" panose="020B0609020204030204" pitchFamily="49" charset="0"/>
-              </a:rPr>
-              <a:t>Follow(statement)</a:t>
-            </a:r>
-          </a:p>
-          <a:p>
-            <a:endParaRPr lang="en-US" dirty="0"/>
+              <a:t>But the follow set differs depending on whether the initial declaration appears as a global declaration or within a subprogram.</a:t>
+            </a:r>
+          </a:p>
+          <a:p>
+            <a:r>
+              <a:rPr lang="en-US" dirty="0"/>
+              <a:t>Solution: Compute the shared follow set dynamically based on scope level.</a:t>
+            </a:r>
           </a:p>
         </p:txBody>
       </p:sp>
@@ -7766,7 +7738,13 @@
   <p:cSld>
     <p:spTree>
       <p:nvGrpSpPr>
-        <p:cNvPr id="1" name=""/>
+        <p:cNvPr id="1" name="">
+          <a:extLst>
+            <a:ext uri="{FF2B5EF4-FFF2-40B4-BE49-F238E27FC236}">
+              <a16:creationId xmlns:a16="http://schemas.microsoft.com/office/drawing/2014/main" id="{E8F2EF01-EB2E-855A-E199-49A9A11C836D}"/>
+            </a:ext>
+          </a:extLst>
+        </p:cNvPr>
         <p:cNvGrpSpPr/>
         <p:nvPr/>
       </p:nvGrpSpPr>
@@ -7783,7 +7761,7 @@
           <p:cNvPr id="2" name="Title 1">
             <a:extLst>
               <a:ext uri="{FF2B5EF4-FFF2-40B4-BE49-F238E27FC236}">
-                <a16:creationId xmlns:a16="http://schemas.microsoft.com/office/drawing/2014/main" id="{5852A216-5CD4-486A-BEA9-A6311DEAF777}"/>
+                <a16:creationId xmlns:a16="http://schemas.microsoft.com/office/drawing/2014/main" id="{1511D0A8-827E-D452-3E17-B716DD92C32C}"/>
               </a:ext>
             </a:extLst>
           </p:cNvPr>
@@ -7807,7 +7785,7 @@
               <a:rPr lang="en-US" dirty="0"/>
             </a:br>
             <a:r>
-              <a:rPr lang="en-US" dirty="0"/>
+              <a:rPr lang="en-US" sz="2400" dirty="0"/>
               <a:t>(continued)</a:t>
             </a:r>
           </a:p>
@@ -7818,7 +7796,7 @@
           <p:cNvPr id="3" name="Content Placeholder 2">
             <a:extLst>
               <a:ext uri="{FF2B5EF4-FFF2-40B4-BE49-F238E27FC236}">
-                <a16:creationId xmlns:a16="http://schemas.microsoft.com/office/drawing/2014/main" id="{CDC71971-D02D-43BB-BFB3-273DA2C6B5D5}"/>
+                <a16:creationId xmlns:a16="http://schemas.microsoft.com/office/drawing/2014/main" id="{10653D13-43F7-7F99-93DA-20DA37E15AC9}"/>
               </a:ext>
             </a:extLst>
           </p:cNvPr>
@@ -7829,14 +7807,135 @@
             <p:ph idx="1"/>
           </p:nvPr>
         </p:nvSpPr>
-        <p:spPr/>
-        <p:txBody>
-          <a:bodyPr/>
-          <a:lstStyle/>
-          <a:p>
-            <a:r>
-              <a:rPr lang="en-US" dirty="0"/>
-              <a:t>Solution: Compute the shared follow set dynamically based on scope level.</a:t>
+        <p:spPr>
+          <a:xfrm>
+            <a:off x="458787" y="1363663"/>
+            <a:ext cx="8412480" cy="4935537"/>
+          </a:xfrm>
+        </p:spPr>
+        <p:txBody>
+          <a:bodyPr/>
+          <a:lstStyle/>
+          <a:p>
+            <a:r>
+              <a:rPr lang="en-US" dirty="0"/>
+              <a:t>Two cases</a:t>
+            </a:r>
+          </a:p>
+          <a:p>
+            <a:pPr lvl="1"/>
+            <a:r>
+              <a:rPr lang="en-US" dirty="0"/>
+              <a:t>Case 1: </a:t>
+            </a:r>
+            <a:r>
+              <a:rPr lang="en-US" dirty="0" err="1">
+                <a:latin typeface="Consolas" panose="020B0609020204030204" pitchFamily="49" charset="0"/>
+              </a:rPr>
+              <a:t>initialDecl</a:t>
+            </a:r>
+            <a:r>
+              <a:rPr lang="en-US" dirty="0"/>
+              <a:t> appears as a global declaration</a:t>
+            </a:r>
+          </a:p>
+          <a:p>
+            <a:pPr lvl="2"/>
+            <a:r>
+              <a:rPr lang="en-US" dirty="0"/>
+              <a:t>can be followed by a subprogram</a:t>
+            </a:r>
+          </a:p>
+          <a:p>
+            <a:pPr lvl="2"/>
+            <a:r>
+              <a:rPr lang="en-US" dirty="0"/>
+              <a:t>follow set includes “</a:t>
+            </a:r>
+            <a:r>
+              <a:rPr lang="en-US" dirty="0">
+                <a:latin typeface="Consolas" panose="020B0609020204030204" pitchFamily="49" charset="0"/>
+              </a:rPr>
+              <a:t>proc</a:t>
+            </a:r>
+            <a:r>
+              <a:rPr lang="en-US" dirty="0"/>
+              <a:t>” and “</a:t>
+            </a:r>
+            <a:r>
+              <a:rPr lang="en-US" dirty="0">
+                <a:latin typeface="Consolas" panose="020B0609020204030204" pitchFamily="49" charset="0"/>
+              </a:rPr>
+              <a:t>fun</a:t>
+            </a:r>
+            <a:r>
+              <a:rPr lang="en-US" dirty="0"/>
+              <a:t>”</a:t>
+            </a:r>
+          </a:p>
+          <a:p>
+            <a:pPr lvl="1"/>
+            <a:r>
+              <a:rPr lang="en-US" dirty="0"/>
+              <a:t>Case 2: </a:t>
+            </a:r>
+            <a:r>
+              <a:rPr lang="en-US" dirty="0" err="1">
+                <a:latin typeface="Consolas" panose="020B0609020204030204" pitchFamily="49" charset="0"/>
+              </a:rPr>
+              <a:t>initialDecl</a:t>
+            </a:r>
+            <a:r>
+              <a:rPr lang="en-US" dirty="0"/>
+              <a:t> appears within a subprogram</a:t>
+            </a:r>
+          </a:p>
+          <a:p>
+            <a:pPr lvl="2"/>
+            <a:r>
+              <a:rPr lang="en-US" dirty="0"/>
+              <a:t>can be followed by zero or more statements</a:t>
+            </a:r>
+          </a:p>
+          <a:p>
+            <a:pPr lvl="2"/>
+            <a:r>
+              <a:rPr lang="en-US" dirty="0"/>
+              <a:t>follow set includes </a:t>
+            </a:r>
+            <a:r>
+              <a:rPr lang="en-US" dirty="0">
+                <a:latin typeface="Consolas" panose="020B0609020204030204" pitchFamily="49" charset="0"/>
+              </a:rPr>
+              <a:t>First(statement)</a:t>
+            </a:r>
+            <a:r>
+              <a:rPr lang="en-US" dirty="0"/>
+              <a:t> or, if there are zero statements, a right brace</a:t>
+            </a:r>
+          </a:p>
+          <a:p>
+            <a:pPr lvl="2"/>
+            <a:r>
+              <a:rPr lang="en-US" dirty="0"/>
+              <a:t>Note: </a:t>
+            </a:r>
+            <a:r>
+              <a:rPr lang="en-US" sz="1700" dirty="0">
+                <a:latin typeface="Consolas" panose="020B0609020204030204" pitchFamily="49" charset="0"/>
+              </a:rPr>
+              <a:t>First(statement) + "}" = Follow(statement) - "else"</a:t>
+            </a:r>
+          </a:p>
+          <a:p>
+            <a:pPr marL="1371600" lvl="3" indent="0">
+              <a:buNone/>
+            </a:pPr>
+            <a:r>
+              <a:rPr lang="en-US" dirty="0">
+                <a:latin typeface="Consolas" panose="020B0609020204030204" pitchFamily="49" charset="0"/>
+              </a:rPr>
+              <a:t> </a:t>
             </a:r>
           </a:p>
           <a:p>
@@ -7849,7 +7948,7 @@
           <p:cNvPr id="4" name="Footer Placeholder 3">
             <a:extLst>
               <a:ext uri="{FF2B5EF4-FFF2-40B4-BE49-F238E27FC236}">
-                <a16:creationId xmlns:a16="http://schemas.microsoft.com/office/drawing/2014/main" id="{354990E4-2AF9-417B-89C5-0544A5C8898C}"/>
+                <a16:creationId xmlns:a16="http://schemas.microsoft.com/office/drawing/2014/main" id="{0FF705BB-597A-0B68-325F-36C35352CC51}"/>
               </a:ext>
             </a:extLst>
           </p:cNvPr>
@@ -7865,6 +7964,9 @@
           <a:bodyPr/>
           <a:lstStyle/>
           <a:p>
+            <a:pPr>
+              <a:defRPr/>
+            </a:pPr>
             <a:r>
               <a:rPr lang="en-US" dirty="0"/>
               <a:t>©SoftMoore Consulting</a:t>
@@ -7877,7 +7979,7 @@
           <p:cNvPr id="5" name="Slide Number Placeholder 4">
             <a:extLst>
               <a:ext uri="{FF2B5EF4-FFF2-40B4-BE49-F238E27FC236}">
-                <a16:creationId xmlns:a16="http://schemas.microsoft.com/office/drawing/2014/main" id="{EE951B0E-07C8-48F0-A77B-1D8ABD1A2EC8}"/>
+                <a16:creationId xmlns:a16="http://schemas.microsoft.com/office/drawing/2014/main" id="{834F3BBB-482E-25A2-066D-D3489B2AA7E1}"/>
               </a:ext>
             </a:extLst>
           </p:cNvPr>
@@ -7893,13 +7995,18 @@
           <a:bodyPr/>
           <a:lstStyle/>
           <a:p>
+            <a:pPr>
+              <a:defRPr/>
+            </a:pPr>
             <a:r>
               <a:rPr lang="en-US"/>
               <a:t>Slide </a:t>
             </a:r>
             <a:fld id="{5F271557-76C1-4390-9827-E45E8E4E29D5}" type="slidenum">
               <a:rPr lang="en-US" smtClean="0"/>
-              <a:pPr/>
+              <a:pPr>
+                <a:defRPr/>
+              </a:pPr>
               <a:t>18</a:t>
             </a:fld>
             <a:endParaRPr lang="en-US"/>
@@ -7909,7 +8016,7 @@
     </p:spTree>
     <p:extLst>
       <p:ext uri="{BB962C8B-B14F-4D97-AF65-F5344CB8AC3E}">
-        <p14:creationId xmlns:p14="http://schemas.microsoft.com/office/powerpoint/2010/main" val="1955865222"/>
+        <p14:creationId xmlns:p14="http://schemas.microsoft.com/office/powerpoint/2010/main" val="3619428305"/>
       </p:ext>
     </p:extLst>
   </p:cSld>
@@ -7989,8 +8096,8 @@
         </p:nvSpPr>
         <p:spPr>
           <a:xfrm>
-            <a:off x="381000" y="1363663"/>
-            <a:ext cx="8503920" cy="4935537"/>
+            <a:off x="457200" y="1363663"/>
+            <a:ext cx="8229600" cy="4935537"/>
           </a:xfrm>
         </p:spPr>
         <p:txBody>
@@ -8004,19 +8111,19 @@
               <a:buNone/>
             </a:pPr>
             <a:r>
-              <a:rPr lang="en-US" sz="1800" dirty="0">
+              <a:rPr lang="en-US" sz="1700" dirty="0">
                 <a:latin typeface="Consolas" panose="020B0609020204030204" pitchFamily="49" charset="0"/>
               </a:rPr>
               <a:t>private Set&lt;Symbol&gt; </a:t>
             </a:r>
             <a:r>
-              <a:rPr lang="en-US" sz="1800" dirty="0" err="1">
+              <a:rPr lang="en-US" sz="1700" dirty="0" err="1">
                 <a:latin typeface="Consolas" panose="020B0609020204030204" pitchFamily="49" charset="0"/>
               </a:rPr>
               <a:t>initialDeclFollowers</a:t>
             </a:r>
             <a:r>
-              <a:rPr lang="en-US" sz="1800" dirty="0">
+              <a:rPr lang="en-US" sz="1700" dirty="0">
                 <a:latin typeface="Consolas" panose="020B0609020204030204" pitchFamily="49" charset="0"/>
               </a:rPr>
               <a:t>()</a:t>
@@ -8030,7 +8137,7 @@
               <a:buNone/>
             </a:pPr>
             <a:r>
-              <a:rPr lang="en-US" sz="1800" dirty="0">
+              <a:rPr lang="en-US" sz="1700" dirty="0">
                 <a:latin typeface="Consolas" panose="020B0609020204030204" pitchFamily="49" charset="0"/>
               </a:rPr>
               <a:t>  {</a:t>
@@ -8044,10 +8151,10 @@
               <a:buNone/>
             </a:pPr>
             <a:r>
-              <a:rPr lang="en-US" sz="1800" dirty="0">
-                <a:latin typeface="Consolas" panose="020B0609020204030204" pitchFamily="49" charset="0"/>
-              </a:rPr>
-              <a:t>    // An initial declaration can always be followed by</a:t>
+              <a:rPr lang="en-US" sz="1700" dirty="0">
+                <a:latin typeface="Consolas" panose="020B0609020204030204" pitchFamily="49" charset="0"/>
+              </a:rPr>
+              <a:t>    // An initial declaration can always be followed by another</a:t>
             </a:r>
           </a:p>
           <a:p>
@@ -8058,10 +8165,10 @@
               <a:buNone/>
             </a:pPr>
             <a:r>
-              <a:rPr lang="en-US" sz="1800" dirty="0">
-                <a:latin typeface="Consolas" panose="020B0609020204030204" pitchFamily="49" charset="0"/>
-              </a:rPr>
-              <a:t>    // another initial declaration, regardless of the</a:t>
+              <a:rPr lang="en-US" sz="1700" dirty="0">
+                <a:latin typeface="Consolas" panose="020B0609020204030204" pitchFamily="49" charset="0"/>
+              </a:rPr>
+              <a:t>    // initial declaration, regardless of the scope level.</a:t>
             </a:r>
           </a:p>
           <a:p>
@@ -8072,22 +8179,22 @@
               <a:buNone/>
             </a:pPr>
             <a:r>
-              <a:rPr lang="en-US" sz="1800" dirty="0">
-                <a:latin typeface="Consolas" panose="020B0609020204030204" pitchFamily="49" charset="0"/>
-              </a:rPr>
-              <a:t>    // scope level of </a:t>
-            </a:r>
-            <a:r>
-              <a:rPr lang="en-US" sz="1800" dirty="0" err="1">
-                <a:latin typeface="Consolas" panose="020B0609020204030204" pitchFamily="49" charset="0"/>
-              </a:rPr>
-              <a:t>IdTable</a:t>
-            </a:r>
-            <a:r>
-              <a:rPr lang="en-US" sz="1800" dirty="0">
-                <a:latin typeface="Consolas" panose="020B0609020204030204" pitchFamily="49" charset="0"/>
-              </a:rPr>
-              <a:t>.</a:t>
+              <a:rPr lang="en-US" sz="1700" dirty="0">
+                <a:latin typeface="Consolas" panose="020B0609020204030204" pitchFamily="49" charset="0"/>
+              </a:rPr>
+              <a:t>    var followers = </a:t>
+            </a:r>
+            <a:r>
+              <a:rPr lang="en-US" sz="1700" dirty="0" err="1">
+                <a:latin typeface="Consolas" panose="020B0609020204030204" pitchFamily="49" charset="0"/>
+              </a:rPr>
+              <a:t>EnumSet.of</a:t>
+            </a:r>
+            <a:r>
+              <a:rPr lang="en-US" sz="1700" dirty="0">
+                <a:latin typeface="Consolas" panose="020B0609020204030204" pitchFamily="49" charset="0"/>
+              </a:rPr>
+              <a:t>(</a:t>
             </a:r>
           </a:p>
           <a:p>
@@ -8098,22 +8205,10 @@
               <a:buNone/>
             </a:pPr>
             <a:r>
-              <a:rPr lang="en-US" sz="1800" dirty="0">
-                <a:latin typeface="Consolas" panose="020B0609020204030204" pitchFamily="49" charset="0"/>
-              </a:rPr>
-              <a:t>    var followers = </a:t>
-            </a:r>
-            <a:r>
-              <a:rPr lang="en-US" sz="1800" dirty="0" err="1">
-                <a:latin typeface="Consolas" panose="020B0609020204030204" pitchFamily="49" charset="0"/>
-              </a:rPr>
-              <a:t>EnumSet.of</a:t>
-            </a:r>
-            <a:r>
-              <a:rPr lang="en-US" sz="1800" dirty="0">
-                <a:latin typeface="Consolas" panose="020B0609020204030204" pitchFamily="49" charset="0"/>
-              </a:rPr>
-              <a:t>(</a:t>
+              <a:rPr lang="en-US" sz="1700" dirty="0">
+                <a:latin typeface="Consolas" panose="020B0609020204030204" pitchFamily="49" charset="0"/>
+              </a:rPr>
+              <a:t>        Symbol.constRW, Symbol.varRW, Symbol.typeRW);</a:t>
             </a:r>
           </a:p>
           <a:p>
@@ -8123,12 +8218,9 @@
               </a:spcBef>
               <a:buNone/>
             </a:pPr>
-            <a:r>
-              <a:rPr lang="en-US" sz="1800" dirty="0">
-                <a:latin typeface="Consolas" panose="020B0609020204030204" pitchFamily="49" charset="0"/>
-              </a:rPr>
-              <a:t>        Symbol.constRW, Symbol.varRW, Symbol.typeRW);</a:t>
-            </a:r>
+            <a:endParaRPr lang="en-US" sz="1700" dirty="0">
+              <a:latin typeface="Consolas" panose="020B0609020204030204" pitchFamily="49" charset="0"/>
+            </a:endParaRPr>
           </a:p>
           <a:p>
             <a:pPr marL="0" indent="0">
@@ -8137,9 +8229,36 @@
               </a:spcBef>
               <a:buNone/>
             </a:pPr>
-            <a:endParaRPr lang="en-US" sz="1800" dirty="0">
-              <a:latin typeface="Consolas" panose="020B0609020204030204" pitchFamily="49" charset="0"/>
-            </a:endParaRPr>
+            <a:r>
+              <a:rPr lang="en-US" sz="1700" dirty="0">
+                <a:latin typeface="Consolas" panose="020B0609020204030204" pitchFamily="49" charset="0"/>
+              </a:rPr>
+              <a:t>    if (</a:t>
+            </a:r>
+            <a:r>
+              <a:rPr lang="en-US" sz="1700" dirty="0" err="1">
+                <a:latin typeface="Consolas" panose="020B0609020204030204" pitchFamily="49" charset="0"/>
+              </a:rPr>
+              <a:t>idTable.getScopeLevel</a:t>
+            </a:r>
+            <a:r>
+              <a:rPr lang="en-US" sz="1700" dirty="0">
+                <a:latin typeface="Consolas" panose="020B0609020204030204" pitchFamily="49" charset="0"/>
+              </a:rPr>
+              <a:t>() == </a:t>
+            </a:r>
+            <a:r>
+              <a:rPr lang="en-US" sz="1700" dirty="0" err="1">
+                <a:latin typeface="Consolas" panose="020B0609020204030204" pitchFamily="49" charset="0"/>
+              </a:rPr>
+              <a:t>ScopeLevel.GLOBAL</a:t>
+            </a:r>
+            <a:r>
+              <a:rPr lang="en-US" sz="1700" dirty="0">
+                <a:latin typeface="Consolas" panose="020B0609020204030204" pitchFamily="49" charset="0"/>
+              </a:rPr>
+              <a:t>)</a:t>
+            </a:r>
           </a:p>
           <a:p>
             <a:pPr marL="0" indent="0">
@@ -8149,34 +8268,58 @@
               <a:buNone/>
             </a:pPr>
             <a:r>
-              <a:rPr lang="en-US" sz="1800" dirty="0">
-                <a:latin typeface="Consolas" panose="020B0609020204030204" pitchFamily="49" charset="0"/>
-              </a:rPr>
-              <a:t>    if (</a:t>
-            </a:r>
-            <a:r>
-              <a:rPr lang="en-US" sz="1800" dirty="0" err="1">
-                <a:latin typeface="Consolas" panose="020B0609020204030204" pitchFamily="49" charset="0"/>
-              </a:rPr>
-              <a:t>idTable.getScopeLevel</a:t>
-            </a:r>
-            <a:r>
-              <a:rPr lang="en-US" sz="1800" dirty="0">
-                <a:latin typeface="Consolas" panose="020B0609020204030204" pitchFamily="49" charset="0"/>
-              </a:rPr>
-              <a:t>() == </a:t>
-            </a:r>
-            <a:r>
-              <a:rPr lang="en-US" sz="1800" dirty="0" err="1">
-                <a:latin typeface="Consolas" panose="020B0609020204030204" pitchFamily="49" charset="0"/>
-              </a:rPr>
-              <a:t>ScopeLevel.LOCAL</a:t>
-            </a:r>
-            <a:r>
-              <a:rPr lang="en-US" sz="1800" dirty="0">
-                <a:latin typeface="Consolas" panose="020B0609020204030204" pitchFamily="49" charset="0"/>
-              </a:rPr>
-              <a:t>)</a:t>
+              <a:rPr lang="en-US" sz="1700" dirty="0">
+                <a:latin typeface="Consolas" panose="020B0609020204030204" pitchFamily="49" charset="0"/>
+              </a:rPr>
+              <a:t>        </a:t>
+            </a:r>
+            <a:r>
+              <a:rPr lang="en-US" sz="1700" dirty="0" err="1">
+                <a:latin typeface="Consolas" panose="020B0609020204030204" pitchFamily="49" charset="0"/>
+              </a:rPr>
+              <a:t>followers.addAll</a:t>
+            </a:r>
+            <a:r>
+              <a:rPr lang="en-US" sz="1700" dirty="0">
+                <a:latin typeface="Consolas" panose="020B0609020204030204" pitchFamily="49" charset="0"/>
+              </a:rPr>
+              <a:t>(</a:t>
+            </a:r>
+            <a:r>
+              <a:rPr lang="en-US" sz="1700" dirty="0" err="1">
+                <a:latin typeface="Consolas" panose="020B0609020204030204" pitchFamily="49" charset="0"/>
+              </a:rPr>
+              <a:t>EnumSet.of</a:t>
+            </a:r>
+            <a:r>
+              <a:rPr lang="en-US" sz="1700" dirty="0">
+                <a:latin typeface="Consolas" panose="020B0609020204030204" pitchFamily="49" charset="0"/>
+              </a:rPr>
+              <a:t>(</a:t>
+            </a:r>
+            <a:r>
+              <a:rPr lang="en-US" sz="1700" dirty="0" err="1">
+                <a:latin typeface="Consolas" panose="020B0609020204030204" pitchFamily="49" charset="0"/>
+              </a:rPr>
+              <a:t>Symbol.procRW</a:t>
+            </a:r>
+            <a:r>
+              <a:rPr lang="en-US" sz="1700" dirty="0">
+                <a:latin typeface="Consolas" panose="020B0609020204030204" pitchFamily="49" charset="0"/>
+              </a:rPr>
+              <a:t>, </a:t>
+            </a:r>
+            <a:r>
+              <a:rPr lang="en-US" sz="1700" dirty="0" err="1">
+                <a:latin typeface="Consolas" panose="020B0609020204030204" pitchFamily="49" charset="0"/>
+              </a:rPr>
+              <a:t>Symbol.funRW</a:t>
+            </a:r>
+            <a:r>
+              <a:rPr lang="en-US" sz="1700" dirty="0">
+                <a:latin typeface="Consolas" panose="020B0609020204030204" pitchFamily="49" charset="0"/>
+              </a:rPr>
+              <a:t>));</a:t>
             </a:r>
           </a:p>
           <a:p>
@@ -8187,34 +8330,10 @@
               <a:buNone/>
             </a:pPr>
             <a:r>
-              <a:rPr lang="en-US" sz="1800" dirty="0">
-                <a:latin typeface="Consolas" panose="020B0609020204030204" pitchFamily="49" charset="0"/>
-              </a:rPr>
-              <a:t>        </a:t>
-            </a:r>
-            <a:r>
-              <a:rPr lang="en-US" sz="1800" dirty="0" err="1">
-                <a:latin typeface="Consolas" panose="020B0609020204030204" pitchFamily="49" charset="0"/>
-              </a:rPr>
-              <a:t>followers.addAll</a:t>
-            </a:r>
-            <a:r>
-              <a:rPr lang="en-US" sz="1800" dirty="0">
-                <a:latin typeface="Consolas" panose="020B0609020204030204" pitchFamily="49" charset="0"/>
-              </a:rPr>
-              <a:t>(</a:t>
-            </a:r>
-            <a:r>
-              <a:rPr lang="en-US" sz="1800" dirty="0" err="1">
-                <a:latin typeface="Consolas" panose="020B0609020204030204" pitchFamily="49" charset="0"/>
-              </a:rPr>
-              <a:t>stmtFollowers</a:t>
-            </a:r>
-            <a:r>
-              <a:rPr lang="en-US" sz="1800" dirty="0">
-                <a:latin typeface="Consolas" panose="020B0609020204030204" pitchFamily="49" charset="0"/>
-              </a:rPr>
-              <a:t>);</a:t>
+              <a:rPr lang="en-US" sz="1700" dirty="0">
+                <a:latin typeface="Consolas" panose="020B0609020204030204" pitchFamily="49" charset="0"/>
+              </a:rPr>
+              <a:t>    else</a:t>
             </a:r>
           </a:p>
           <a:p>
@@ -8225,10 +8344,10 @@
               <a:buNone/>
             </a:pPr>
             <a:r>
-              <a:rPr lang="en-US" sz="1800" dirty="0">
-                <a:latin typeface="Consolas" panose="020B0609020204030204" pitchFamily="49" charset="0"/>
-              </a:rPr>
-              <a:t>    else</a:t>
+              <a:rPr lang="en-US" sz="1700" dirty="0">
+                <a:latin typeface="Consolas" panose="020B0609020204030204" pitchFamily="49" charset="0"/>
+              </a:rPr>
+              <a:t>      {</a:t>
             </a:r>
           </a:p>
           <a:p>
@@ -8239,58 +8358,34 @@
               <a:buNone/>
             </a:pPr>
             <a:r>
-              <a:rPr lang="en-US" sz="1800" dirty="0">
+              <a:rPr lang="en-US" sz="1700" dirty="0">
                 <a:latin typeface="Consolas" panose="020B0609020204030204" pitchFamily="49" charset="0"/>
               </a:rPr>
               <a:t>        </a:t>
             </a:r>
             <a:r>
-              <a:rPr lang="en-US" sz="1800" dirty="0" err="1">
+              <a:rPr lang="en-US" sz="1700" dirty="0" err="1">
                 <a:latin typeface="Consolas" panose="020B0609020204030204" pitchFamily="49" charset="0"/>
               </a:rPr>
               <a:t>followers.addAll</a:t>
             </a:r>
             <a:r>
-              <a:rPr lang="en-US" sz="1800" dirty="0">
+              <a:rPr lang="en-US" sz="1700" dirty="0">
                 <a:latin typeface="Consolas" panose="020B0609020204030204" pitchFamily="49" charset="0"/>
               </a:rPr>
               <a:t>(</a:t>
             </a:r>
             <a:r>
-              <a:rPr lang="en-US" sz="1800" dirty="0" err="1">
-                <a:latin typeface="Consolas" panose="020B0609020204030204" pitchFamily="49" charset="0"/>
-              </a:rPr>
-              <a:t>EnumSet.of</a:t>
-            </a:r>
-            <a:r>
-              <a:rPr lang="en-US" sz="1800" dirty="0">
-                <a:latin typeface="Consolas" panose="020B0609020204030204" pitchFamily="49" charset="0"/>
-              </a:rPr>
-              <a:t>(</a:t>
-            </a:r>
-            <a:r>
-              <a:rPr lang="en-US" sz="1800" dirty="0" err="1">
-                <a:latin typeface="Consolas" panose="020B0609020204030204" pitchFamily="49" charset="0"/>
-              </a:rPr>
-              <a:t>Symbol.procRW</a:t>
-            </a:r>
-            <a:r>
-              <a:rPr lang="en-US" sz="1800" dirty="0">
-                <a:latin typeface="Consolas" panose="020B0609020204030204" pitchFamily="49" charset="0"/>
-              </a:rPr>
-              <a:t>, </a:t>
-            </a:r>
-            <a:r>
-              <a:rPr lang="en-US" sz="1800" dirty="0" err="1">
-                <a:latin typeface="Consolas" panose="020B0609020204030204" pitchFamily="49" charset="0"/>
-              </a:rPr>
-              <a:t>Symbol.funRW</a:t>
-            </a:r>
-            <a:r>
-              <a:rPr lang="en-US" sz="1800" dirty="0">
-                <a:latin typeface="Consolas" panose="020B0609020204030204" pitchFamily="49" charset="0"/>
-              </a:rPr>
-              <a:t>));</a:t>
+              <a:rPr lang="en-US" sz="1700" dirty="0" err="1">
+                <a:latin typeface="Consolas" panose="020B0609020204030204" pitchFamily="49" charset="0"/>
+              </a:rPr>
+              <a:t>stmtFollowers</a:t>
+            </a:r>
+            <a:r>
+              <a:rPr lang="en-US" sz="1700" dirty="0">
+                <a:latin typeface="Consolas" panose="020B0609020204030204" pitchFamily="49" charset="0"/>
+              </a:rPr>
+              <a:t>);</a:t>
             </a:r>
           </a:p>
           <a:p>
@@ -8300,9 +8395,36 @@
               </a:spcBef>
               <a:buNone/>
             </a:pPr>
-            <a:endParaRPr lang="en-US" sz="1800" dirty="0">
-              <a:latin typeface="Consolas" panose="020B0609020204030204" pitchFamily="49" charset="0"/>
-            </a:endParaRPr>
+            <a:r>
+              <a:rPr lang="en-US" sz="1700" dirty="0">
+                <a:latin typeface="Consolas" panose="020B0609020204030204" pitchFamily="49" charset="0"/>
+              </a:rPr>
+              <a:t>        </a:t>
+            </a:r>
+            <a:r>
+              <a:rPr lang="en-US" sz="1700" dirty="0" err="1">
+                <a:latin typeface="Consolas" panose="020B0609020204030204" pitchFamily="49" charset="0"/>
+              </a:rPr>
+              <a:t>followers.remove</a:t>
+            </a:r>
+            <a:r>
+              <a:rPr lang="en-US" sz="1700" dirty="0">
+                <a:latin typeface="Consolas" panose="020B0609020204030204" pitchFamily="49" charset="0"/>
+              </a:rPr>
+              <a:t>(</a:t>
+            </a:r>
+            <a:r>
+              <a:rPr lang="en-US" sz="1700" dirty="0" err="1">
+                <a:latin typeface="Consolas" panose="020B0609020204030204" pitchFamily="49" charset="0"/>
+              </a:rPr>
+              <a:t>Symbol.elseRW</a:t>
+            </a:r>
+            <a:r>
+              <a:rPr lang="en-US" sz="1700" dirty="0">
+                <a:latin typeface="Consolas" panose="020B0609020204030204" pitchFamily="49" charset="0"/>
+              </a:rPr>
+              <a:t>);</a:t>
+            </a:r>
           </a:p>
           <a:p>
             <a:pPr marL="0" indent="0">
@@ -8312,10 +8434,10 @@
               <a:buNone/>
             </a:pPr>
             <a:r>
-              <a:rPr lang="en-US" sz="1800" dirty="0">
-                <a:latin typeface="Consolas" panose="020B0609020204030204" pitchFamily="49" charset="0"/>
-              </a:rPr>
-              <a:t>    return followers;</a:t>
+              <a:rPr lang="en-US" sz="1700" dirty="0">
+                <a:latin typeface="Consolas" panose="020B0609020204030204" pitchFamily="49" charset="0"/>
+              </a:rPr>
+              <a:t>      }</a:t>
             </a:r>
           </a:p>
           <a:p>
@@ -8325,11 +8447,36 @@
               </a:spcBef>
               <a:buNone/>
             </a:pPr>
-            <a:r>
-              <a:rPr lang="en-US" sz="1800" dirty="0">
-                <a:latin typeface="Consolas" panose="020B0609020204030204" pitchFamily="49" charset="0"/>
-              </a:rPr>
-              <a:t>  };</a:t>
+            <a:endParaRPr lang="en-US" sz="1700" dirty="0">
+              <a:latin typeface="Consolas" panose="020B0609020204030204" pitchFamily="49" charset="0"/>
+            </a:endParaRPr>
+          </a:p>
+          <a:p>
+            <a:pPr marL="0" indent="0">
+              <a:spcBef>
+                <a:spcPts val="100"/>
+              </a:spcBef>
+              <a:buNone/>
+            </a:pPr>
+            <a:r>
+              <a:rPr lang="en-US" sz="1700" dirty="0">
+                <a:latin typeface="Consolas" panose="020B0609020204030204" pitchFamily="49" charset="0"/>
+              </a:rPr>
+              <a:t>    return followers;</a:t>
+            </a:r>
+          </a:p>
+          <a:p>
+            <a:pPr marL="0" indent="0">
+              <a:spcBef>
+                <a:spcPts val="100"/>
+              </a:spcBef>
+              <a:buNone/>
+            </a:pPr>
+            <a:r>
+              <a:rPr lang="en-US" sz="1700" dirty="0">
+                <a:latin typeface="Consolas" panose="020B0609020204030204" pitchFamily="49" charset="0"/>
+              </a:rPr>
+              <a:t>  }</a:t>
             </a:r>
           </a:p>
         </p:txBody>
@@ -8920,7 +9067,7 @@
         <p:spPr>
           <a:xfrm>
             <a:off x="458787" y="1363663"/>
-            <a:ext cx="8229600" cy="4935537"/>
+            <a:ext cx="8321040" cy="4935537"/>
           </a:xfrm>
         </p:spPr>
         <p:txBody>
@@ -8943,98 +9090,265 @@
             </a:r>
           </a:p>
           <a:p>
-            <a:pPr lvl="1"/>
-            <a:r>
-              <a:rPr lang="en-US" sz="1850" dirty="0">
-                <a:latin typeface="Consolas" panose="020B0609020204030204" pitchFamily="49" charset="0"/>
+            <a:pPr marL="674370" lvl="1">
+              <a:lnSpc>
+                <a:spcPct val="104000"/>
+              </a:lnSpc>
+              <a:spcBef>
+                <a:spcPts val="0"/>
+              </a:spcBef>
+              <a:spcAft>
+                <a:spcPts val="0"/>
+              </a:spcAft>
+              <a:tabLst>
+                <a:tab pos="0" algn="l"/>
+              </a:tabLst>
+            </a:pPr>
+            <a:r>
+              <a:rPr lang="en-US" sz="1700" dirty="0">
+                <a:effectLst/>
+                <a:latin typeface="Consolas" panose="020B0609020204030204" pitchFamily="49" charset="0"/>
+                <a:ea typeface="Calibri" panose="020F0502020204030204" pitchFamily="34" charset="0"/>
+                <a:cs typeface="Courier New" panose="02070309020205020404" pitchFamily="49" charset="0"/>
               </a:rPr>
               <a:t>match()</a:t>
             </a:r>
           </a:p>
           <a:p>
-            <a:pPr lvl="1"/>
-            <a:r>
-              <a:rPr lang="en-US" sz="1850" dirty="0" err="1">
-                <a:latin typeface="Consolas" panose="020B0609020204030204" pitchFamily="49" charset="0"/>
+            <a:pPr marL="674370" lvl="1">
+              <a:lnSpc>
+                <a:spcPct val="104000"/>
+              </a:lnSpc>
+              <a:spcBef>
+                <a:spcPts val="0"/>
+              </a:spcBef>
+              <a:spcAft>
+                <a:spcPts val="0"/>
+              </a:spcAft>
+              <a:tabLst>
+                <a:tab pos="0" algn="l"/>
+              </a:tabLst>
+            </a:pPr>
+            <a:r>
+              <a:rPr lang="en-US" sz="1700" dirty="0" err="1">
+                <a:effectLst/>
+                <a:latin typeface="Consolas" panose="020B0609020204030204" pitchFamily="49" charset="0"/>
+                <a:ea typeface="Calibri" panose="020F0502020204030204" pitchFamily="34" charset="0"/>
+                <a:cs typeface="Courier New" panose="02070309020205020404" pitchFamily="49" charset="0"/>
+              </a:rPr>
+              <a:t>parseVariableCommon</a:t>
+            </a:r>
+            <a:r>
+              <a:rPr lang="en-US" sz="1700" dirty="0">
+                <a:effectLst/>
+                <a:latin typeface="Consolas" panose="020B0609020204030204" pitchFamily="49" charset="0"/>
+                <a:ea typeface="Calibri" panose="020F0502020204030204" pitchFamily="34" charset="0"/>
+                <a:cs typeface="Courier New" panose="02070309020205020404" pitchFamily="49" charset="0"/>
+              </a:rPr>
+              <a:t>()  // called only by </a:t>
+            </a:r>
+            <a:r>
+              <a:rPr lang="en-US" sz="1700" dirty="0" err="1">
+                <a:effectLst/>
+                <a:latin typeface="Consolas" panose="020B0609020204030204" pitchFamily="49" charset="0"/>
+                <a:ea typeface="Calibri" panose="020F0502020204030204" pitchFamily="34" charset="0"/>
+                <a:cs typeface="Courier New" panose="02070309020205020404" pitchFamily="49" charset="0"/>
+              </a:rPr>
+              <a:t>parseVariable</a:t>
+            </a:r>
+            <a:r>
+              <a:rPr lang="en-US" sz="1700" dirty="0">
+                <a:effectLst/>
+                <a:latin typeface="Consolas" panose="020B0609020204030204" pitchFamily="49" charset="0"/>
+                <a:ea typeface="Calibri" panose="020F0502020204030204" pitchFamily="34" charset="0"/>
+                <a:cs typeface="Courier New" panose="02070309020205020404" pitchFamily="49" charset="0"/>
+              </a:rPr>
+              <a:t>()</a:t>
+            </a:r>
+            <a:br>
+              <a:rPr lang="en-US" sz="1700" dirty="0">
+                <a:latin typeface="Consolas" panose="020B0609020204030204" pitchFamily="49" charset="0"/>
+                <a:ea typeface="Calibri" panose="020F0502020204030204" pitchFamily="34" charset="0"/>
+                <a:cs typeface="Courier New" panose="02070309020205020404" pitchFamily="49" charset="0"/>
+              </a:rPr>
+            </a:br>
+            <a:r>
+              <a:rPr lang="en-US" sz="1700" dirty="0">
+                <a:latin typeface="Consolas" panose="020B0609020204030204" pitchFamily="49" charset="0"/>
+                <a:ea typeface="Calibri" panose="020F0502020204030204" pitchFamily="34" charset="0"/>
+                <a:cs typeface="Courier New" panose="02070309020205020404" pitchFamily="49" charset="0"/>
+              </a:rPr>
+              <a:t>                       </a:t>
+            </a:r>
+            <a:r>
+              <a:rPr lang="en-US" sz="1700">
+                <a:latin typeface="Consolas" panose="020B0609020204030204" pitchFamily="49" charset="0"/>
+                <a:ea typeface="Calibri" panose="020F0502020204030204" pitchFamily="34" charset="0"/>
+                <a:cs typeface="Courier New" panose="02070309020205020404" pitchFamily="49" charset="0"/>
+              </a:rPr>
+              <a:t>//    and </a:t>
+            </a:r>
+            <a:r>
+              <a:rPr lang="en-US" sz="1700" dirty="0" err="1">
+                <a:latin typeface="Consolas" panose="020B0609020204030204" pitchFamily="49" charset="0"/>
+                <a:ea typeface="Calibri" panose="020F0502020204030204" pitchFamily="34" charset="0"/>
+                <a:cs typeface="Courier New" panose="02070309020205020404" pitchFamily="49" charset="0"/>
               </a:rPr>
               <a:t>parseVariableExpr</a:t>
             </a:r>
             <a:r>
-              <a:rPr lang="en-US" sz="1850" dirty="0">
-                <a:latin typeface="Consolas" panose="020B0609020204030204" pitchFamily="49" charset="0"/>
+              <a:rPr lang="en-US" sz="1700" dirty="0">
+                <a:latin typeface="Consolas" panose="020B0609020204030204" pitchFamily="49" charset="0"/>
+                <a:ea typeface="Calibri" panose="020F0502020204030204" pitchFamily="34" charset="0"/>
+                <a:cs typeface="Courier New" panose="02070309020205020404" pitchFamily="49" charset="0"/>
+              </a:rPr>
+              <a:t>()  </a:t>
+            </a:r>
+            <a:endParaRPr lang="en-US" sz="1700" dirty="0">
+              <a:effectLst/>
+              <a:latin typeface="Consolas" panose="020B0609020204030204" pitchFamily="49" charset="0"/>
+              <a:ea typeface="Calibri" panose="020F0502020204030204" pitchFamily="34" charset="0"/>
+              <a:cs typeface="Courier New" panose="02070309020205020404" pitchFamily="49" charset="0"/>
+            </a:endParaRPr>
+          </a:p>
+          <a:p>
+            <a:pPr marL="674370" lvl="1">
+              <a:lnSpc>
+                <a:spcPct val="104000"/>
+              </a:lnSpc>
+              <a:spcBef>
+                <a:spcPts val="0"/>
+              </a:spcBef>
+              <a:spcAft>
+                <a:spcPts val="0"/>
+              </a:spcAft>
+              <a:tabLst>
+                <a:tab pos="0" algn="l"/>
+              </a:tabLst>
+            </a:pPr>
+            <a:r>
+              <a:rPr lang="en-US" sz="1700" dirty="0" err="1">
+                <a:effectLst/>
+                <a:latin typeface="Consolas" panose="020B0609020204030204" pitchFamily="49" charset="0"/>
+                <a:ea typeface="Calibri" panose="020F0502020204030204" pitchFamily="34" charset="0"/>
+                <a:cs typeface="Courier New" panose="02070309020205020404" pitchFamily="49" charset="0"/>
+              </a:rPr>
+              <a:t>parseIndexExpr</a:t>
+            </a:r>
+            <a:r>
+              <a:rPr lang="en-US" sz="1700" dirty="0">
+                <a:effectLst/>
+                <a:latin typeface="Consolas" panose="020B0609020204030204" pitchFamily="49" charset="0"/>
+                <a:ea typeface="Calibri" panose="020F0502020204030204" pitchFamily="34" charset="0"/>
+                <a:cs typeface="Courier New" panose="02070309020205020404" pitchFamily="49" charset="0"/>
+              </a:rPr>
+              <a:t>()       // called only by </a:t>
+            </a:r>
+            <a:r>
+              <a:rPr lang="en-US" sz="1700" dirty="0" err="1">
+                <a:effectLst/>
+                <a:latin typeface="Consolas" panose="020B0609020204030204" pitchFamily="49" charset="0"/>
+                <a:ea typeface="Calibri" panose="020F0502020204030204" pitchFamily="34" charset="0"/>
+                <a:cs typeface="Courier New" panose="02070309020205020404" pitchFamily="49" charset="0"/>
+              </a:rPr>
+              <a:t>parseVariableCommon</a:t>
+            </a:r>
+            <a:r>
+              <a:rPr lang="en-US" sz="1700" dirty="0">
+                <a:effectLst/>
+                <a:latin typeface="Consolas" panose="020B0609020204030204" pitchFamily="49" charset="0"/>
+                <a:ea typeface="Calibri" panose="020F0502020204030204" pitchFamily="34" charset="0"/>
+                <a:cs typeface="Courier New" panose="02070309020205020404" pitchFamily="49" charset="0"/>
               </a:rPr>
               <a:t>()</a:t>
             </a:r>
           </a:p>
           <a:p>
-            <a:pPr lvl="1"/>
-            <a:r>
-              <a:rPr lang="en-US" sz="1850" dirty="0" err="1">
-                <a:latin typeface="Consolas" panose="020B0609020204030204" pitchFamily="49" charset="0"/>
-              </a:rPr>
-              <a:t>parseIndexExpr</a:t>
-            </a:r>
-            <a:r>
-              <a:rPr lang="en-US" sz="1850" dirty="0">
-                <a:latin typeface="Consolas" panose="020B0609020204030204" pitchFamily="49" charset="0"/>
-              </a:rPr>
-              <a:t>()   // called only by </a:t>
-            </a:r>
-            <a:r>
-              <a:rPr lang="en-US" sz="1850" dirty="0" err="1">
-                <a:latin typeface="Consolas" panose="020B0609020204030204" pitchFamily="49" charset="0"/>
-              </a:rPr>
-              <a:t>parseVariableExpr</a:t>
-            </a:r>
-            <a:r>
-              <a:rPr lang="en-US" sz="1850" dirty="0">
-                <a:latin typeface="Consolas" panose="020B0609020204030204" pitchFamily="49" charset="0"/>
+            <a:pPr marL="674370" lvl="1">
+              <a:lnSpc>
+                <a:spcPct val="104000"/>
+              </a:lnSpc>
+              <a:spcBef>
+                <a:spcPts val="0"/>
+              </a:spcBef>
+              <a:spcAft>
+                <a:spcPts val="0"/>
+              </a:spcAft>
+              <a:tabLst>
+                <a:tab pos="0" algn="l"/>
+              </a:tabLst>
+            </a:pPr>
+            <a:r>
+              <a:rPr lang="en-US" sz="1700" dirty="0" err="1">
+                <a:effectLst/>
+                <a:latin typeface="Consolas" panose="020B0609020204030204" pitchFamily="49" charset="0"/>
+                <a:ea typeface="Calibri" panose="020F0502020204030204" pitchFamily="34" charset="0"/>
+                <a:cs typeface="Courier New" panose="02070309020205020404" pitchFamily="49" charset="0"/>
+              </a:rPr>
+              <a:t>parseFieldExpr</a:t>
+            </a:r>
+            <a:r>
+              <a:rPr lang="en-US" sz="1700" dirty="0">
+                <a:effectLst/>
+                <a:latin typeface="Consolas" panose="020B0609020204030204" pitchFamily="49" charset="0"/>
+                <a:ea typeface="Calibri" panose="020F0502020204030204" pitchFamily="34" charset="0"/>
+                <a:cs typeface="Courier New" panose="02070309020205020404" pitchFamily="49" charset="0"/>
+              </a:rPr>
+              <a:t>()       // called only by </a:t>
+            </a:r>
+            <a:r>
+              <a:rPr lang="en-US" sz="1700" dirty="0" err="1">
+                <a:effectLst/>
+                <a:latin typeface="Consolas" panose="020B0609020204030204" pitchFamily="49" charset="0"/>
+                <a:ea typeface="Calibri" panose="020F0502020204030204" pitchFamily="34" charset="0"/>
+                <a:cs typeface="Courier New" panose="02070309020205020404" pitchFamily="49" charset="0"/>
+              </a:rPr>
+              <a:t>parseVariableCommon</a:t>
+            </a:r>
+            <a:r>
+              <a:rPr lang="en-US" sz="1700" dirty="0">
+                <a:effectLst/>
+                <a:latin typeface="Consolas" panose="020B0609020204030204" pitchFamily="49" charset="0"/>
+                <a:ea typeface="Calibri" panose="020F0502020204030204" pitchFamily="34" charset="0"/>
+                <a:cs typeface="Courier New" panose="02070309020205020404" pitchFamily="49" charset="0"/>
               </a:rPr>
               <a:t>()</a:t>
             </a:r>
           </a:p>
           <a:p>
-            <a:pPr lvl="1"/>
-            <a:r>
-              <a:rPr lang="en-US" sz="1850" dirty="0" err="1">
-                <a:latin typeface="Consolas" panose="020B0609020204030204" pitchFamily="49" charset="0"/>
-              </a:rPr>
-              <a:t>parseFieldExpr</a:t>
-            </a:r>
-            <a:r>
-              <a:rPr lang="en-US" sz="1850" dirty="0">
-                <a:latin typeface="Consolas" panose="020B0609020204030204" pitchFamily="49" charset="0"/>
-              </a:rPr>
-              <a:t>()   // called only by </a:t>
-            </a:r>
-            <a:r>
-              <a:rPr lang="en-US" sz="1850" dirty="0" err="1">
-                <a:latin typeface="Consolas" panose="020B0609020204030204" pitchFamily="49" charset="0"/>
-              </a:rPr>
-              <a:t>parseVariableExpr</a:t>
-            </a:r>
-            <a:r>
-              <a:rPr lang="en-US" sz="1850" dirty="0">
-                <a:latin typeface="Consolas" panose="020B0609020204030204" pitchFamily="49" charset="0"/>
-              </a:rPr>
-              <a:t>()</a:t>
-            </a:r>
-          </a:p>
-          <a:p>
-            <a:pPr lvl="1"/>
-            <a:r>
-              <a:rPr lang="en-US" sz="1850" dirty="0">
-                <a:latin typeface="Consolas" panose="020B0609020204030204" pitchFamily="49" charset="0"/>
-              </a:rPr>
-              <a:t>add()              // in class </a:t>
-            </a:r>
-            <a:r>
-              <a:rPr lang="en-US" sz="1850" dirty="0" err="1">
-                <a:latin typeface="Consolas" panose="020B0609020204030204" pitchFamily="49" charset="0"/>
+            <a:pPr marL="674370" lvl="1">
+              <a:lnSpc>
+                <a:spcPct val="104000"/>
+              </a:lnSpc>
+              <a:spcBef>
+                <a:spcPts val="0"/>
+              </a:spcBef>
+              <a:spcAft>
+                <a:spcPts val="0"/>
+              </a:spcAft>
+              <a:tabLst>
+                <a:tab pos="0" algn="l"/>
+              </a:tabLst>
+            </a:pPr>
+            <a:r>
+              <a:rPr lang="en-US" sz="1700" dirty="0">
+                <a:effectLst/>
+                <a:latin typeface="Consolas" panose="020B0609020204030204" pitchFamily="49" charset="0"/>
+                <a:ea typeface="Calibri" panose="020F0502020204030204" pitchFamily="34" charset="0"/>
+                <a:cs typeface="Courier New" panose="02070309020205020404" pitchFamily="49" charset="0"/>
+              </a:rPr>
+              <a:t>add()                  // in class </a:t>
+            </a:r>
+            <a:r>
+              <a:rPr lang="en-US" sz="1700" dirty="0" err="1">
+                <a:effectLst/>
+                <a:latin typeface="Consolas" panose="020B0609020204030204" pitchFamily="49" charset="0"/>
+                <a:ea typeface="Calibri" panose="020F0502020204030204" pitchFamily="34" charset="0"/>
+                <a:cs typeface="Courier New" panose="02070309020205020404" pitchFamily="49" charset="0"/>
               </a:rPr>
               <a:t>IdTable</a:t>
             </a:r>
-            <a:endParaRPr lang="en-US" sz="1850" dirty="0">
+            <a:endParaRPr lang="en-US" sz="1700" dirty="0">
               <a:latin typeface="Consolas" panose="020B0609020204030204" pitchFamily="49" charset="0"/>
             </a:endParaRPr>
           </a:p>
@@ -10265,7 +10579,15 @@
             <a:pPr algn="l"/>
             <a:r>
               <a:rPr lang="en-US" sz="2000" dirty="0"/>
-              <a:t>use a nested </a:t>
+              <a:t>use a </a:t>
+            </a:r>
+            <a:r>
+              <a:rPr lang="en-US" sz="2000" b="1" dirty="0"/>
+              <a:t>nested</a:t>
+            </a:r>
+            <a:r>
+              <a:rPr lang="en-US" sz="2000" dirty="0"/>
+              <a:t> </a:t>
             </a:r>
             <a:r>
               <a:rPr lang="en-US" sz="2000" dirty="0">
@@ -12515,9 +12837,9 @@
           <a:bodyPr lIns="182880" tIns="91440"/>
           <a:lstStyle/>
           <a:p>
-            <a:pPr marL="0" indent="0">
+            <a:pPr marL="182880" indent="0">
               <a:spcBef>
-                <a:spcPts val="100"/>
+                <a:spcPts val="200"/>
               </a:spcBef>
               <a:buFontTx/>
               <a:buNone/>
@@ -12530,9 +12852,9 @@
             </a:r>
           </a:p>
           <a:p>
-            <a:pPr marL="0" indent="0">
+            <a:pPr marL="182880" indent="0">
               <a:spcBef>
-                <a:spcPts val="100"/>
+                <a:spcPts val="200"/>
               </a:spcBef>
               <a:buFontTx/>
               <a:buNone/>
@@ -12545,9 +12867,9 @@
             </a:r>
           </a:p>
           <a:p>
-            <a:pPr marL="0" indent="0">
+            <a:pPr marL="182880" indent="0">
               <a:spcBef>
-                <a:spcPts val="100"/>
+                <a:spcPts val="200"/>
               </a:spcBef>
               <a:buFontTx/>
               <a:buNone/>
@@ -12560,9 +12882,9 @@
             </a:r>
           </a:p>
           <a:p>
-            <a:pPr marL="0" indent="0">
+            <a:pPr marL="182880" indent="0">
               <a:spcBef>
-                <a:spcPts val="100"/>
+                <a:spcPts val="200"/>
               </a:spcBef>
               <a:buFontTx/>
               <a:buNone/>
@@ -12575,9 +12897,9 @@
             </a:r>
           </a:p>
           <a:p>
-            <a:pPr marL="0" indent="0">
+            <a:pPr marL="182880" indent="0">
               <a:spcBef>
-                <a:spcPts val="100"/>
+                <a:spcPts val="200"/>
               </a:spcBef>
               <a:buFontTx/>
               <a:buNone/>
@@ -12614,9 +12936,9 @@
             </a:r>
           </a:p>
           <a:p>
-            <a:pPr marL="0" indent="0">
+            <a:pPr marL="182880" indent="0">
               <a:spcBef>
-                <a:spcPts val="100"/>
+                <a:spcPts val="200"/>
               </a:spcBef>
               <a:buFontTx/>
               <a:buNone/>
@@ -12708,9 +13030,9 @@
             </a:r>
           </a:p>
           <a:p>
-            <a:pPr marL="0" indent="0">
+            <a:pPr marL="182880" indent="0">
               <a:spcBef>
-                <a:spcPts val="100"/>
+                <a:spcPts val="200"/>
               </a:spcBef>
               <a:buFontTx/>
               <a:buNone/>
@@ -12735,9 +13057,9 @@
             </a:r>
           </a:p>
           <a:p>
-            <a:pPr marL="0" indent="0">
+            <a:pPr marL="182880" indent="0">
               <a:spcBef>
-                <a:spcPts val="100"/>
+                <a:spcPts val="200"/>
               </a:spcBef>
               <a:buFontTx/>
               <a:buNone/>

</xml_diff>

<commit_message>
updates to three slides
</commit_message>
<xml_diff>
--- a/PowerPoints/07 - Error Handling.pptx
+++ b/PowerPoints/07 - Error Handling.pptx
@@ -9075,8 +9075,12 @@
           <a:lstStyle/>
           <a:p>
             <a:r>
-              <a:rPr lang="en-US" dirty="0"/>
-              <a:t>Only five methods throw a </a:t>
+              <a:rPr lang="en-US"/>
+              <a:t>Only three </a:t>
+            </a:r>
+            <a:r>
+              <a:rPr lang="en-US" dirty="0"/>
+              <a:t>methods throw a </a:t>
             </a:r>
             <a:r>
               <a:rPr lang="en-US" dirty="0" err="1">
@@ -9178,15 +9182,7 @@
                 <a:ea typeface="Calibri" panose="020F0502020204030204" pitchFamily="34" charset="0"/>
                 <a:cs typeface="Courier New" panose="02070309020205020404" pitchFamily="49" charset="0"/>
               </a:rPr>
-              <a:t>                       </a:t>
-            </a:r>
-            <a:r>
-              <a:rPr lang="en-US" sz="1700">
-                <a:latin typeface="Consolas" panose="020B0609020204030204" pitchFamily="49" charset="0"/>
-                <a:ea typeface="Calibri" panose="020F0502020204030204" pitchFamily="34" charset="0"/>
-                <a:cs typeface="Courier New" panose="02070309020205020404" pitchFamily="49" charset="0"/>
-              </a:rPr>
-              <a:t>//    and </a:t>
+              <a:t>                       //    and </a:t>
             </a:r>
             <a:r>
               <a:rPr lang="en-US" sz="1700" dirty="0" err="1">
@@ -9210,110 +9206,6 @@
               <a:ea typeface="Calibri" panose="020F0502020204030204" pitchFamily="34" charset="0"/>
               <a:cs typeface="Courier New" panose="02070309020205020404" pitchFamily="49" charset="0"/>
             </a:endParaRPr>
-          </a:p>
-          <a:p>
-            <a:pPr marL="674370" lvl="1">
-              <a:lnSpc>
-                <a:spcPct val="104000"/>
-              </a:lnSpc>
-              <a:spcBef>
-                <a:spcPts val="0"/>
-              </a:spcBef>
-              <a:spcAft>
-                <a:spcPts val="0"/>
-              </a:spcAft>
-              <a:tabLst>
-                <a:tab pos="0" algn="l"/>
-              </a:tabLst>
-            </a:pPr>
-            <a:r>
-              <a:rPr lang="en-US" sz="1700" dirty="0" err="1">
-                <a:effectLst/>
-                <a:latin typeface="Consolas" panose="020B0609020204030204" pitchFamily="49" charset="0"/>
-                <a:ea typeface="Calibri" panose="020F0502020204030204" pitchFamily="34" charset="0"/>
-                <a:cs typeface="Courier New" panose="02070309020205020404" pitchFamily="49" charset="0"/>
-              </a:rPr>
-              <a:t>parseIndexExpr</a:t>
-            </a:r>
-            <a:r>
-              <a:rPr lang="en-US" sz="1700" dirty="0">
-                <a:effectLst/>
-                <a:latin typeface="Consolas" panose="020B0609020204030204" pitchFamily="49" charset="0"/>
-                <a:ea typeface="Calibri" panose="020F0502020204030204" pitchFamily="34" charset="0"/>
-                <a:cs typeface="Courier New" panose="02070309020205020404" pitchFamily="49" charset="0"/>
-              </a:rPr>
-              <a:t>()       // called only by </a:t>
-            </a:r>
-            <a:r>
-              <a:rPr lang="en-US" sz="1700" dirty="0" err="1">
-                <a:effectLst/>
-                <a:latin typeface="Consolas" panose="020B0609020204030204" pitchFamily="49" charset="0"/>
-                <a:ea typeface="Calibri" panose="020F0502020204030204" pitchFamily="34" charset="0"/>
-                <a:cs typeface="Courier New" panose="02070309020205020404" pitchFamily="49" charset="0"/>
-              </a:rPr>
-              <a:t>parseVariableCommon</a:t>
-            </a:r>
-            <a:r>
-              <a:rPr lang="en-US" sz="1700" dirty="0">
-                <a:effectLst/>
-                <a:latin typeface="Consolas" panose="020B0609020204030204" pitchFamily="49" charset="0"/>
-                <a:ea typeface="Calibri" panose="020F0502020204030204" pitchFamily="34" charset="0"/>
-                <a:cs typeface="Courier New" panose="02070309020205020404" pitchFamily="49" charset="0"/>
-              </a:rPr>
-              <a:t>()</a:t>
-            </a:r>
-          </a:p>
-          <a:p>
-            <a:pPr marL="674370" lvl="1">
-              <a:lnSpc>
-                <a:spcPct val="104000"/>
-              </a:lnSpc>
-              <a:spcBef>
-                <a:spcPts val="0"/>
-              </a:spcBef>
-              <a:spcAft>
-                <a:spcPts val="0"/>
-              </a:spcAft>
-              <a:tabLst>
-                <a:tab pos="0" algn="l"/>
-              </a:tabLst>
-            </a:pPr>
-            <a:r>
-              <a:rPr lang="en-US" sz="1700" dirty="0" err="1">
-                <a:effectLst/>
-                <a:latin typeface="Consolas" panose="020B0609020204030204" pitchFamily="49" charset="0"/>
-                <a:ea typeface="Calibri" panose="020F0502020204030204" pitchFamily="34" charset="0"/>
-                <a:cs typeface="Courier New" panose="02070309020205020404" pitchFamily="49" charset="0"/>
-              </a:rPr>
-              <a:t>parseFieldExpr</a:t>
-            </a:r>
-            <a:r>
-              <a:rPr lang="en-US" sz="1700" dirty="0">
-                <a:effectLst/>
-                <a:latin typeface="Consolas" panose="020B0609020204030204" pitchFamily="49" charset="0"/>
-                <a:ea typeface="Calibri" panose="020F0502020204030204" pitchFamily="34" charset="0"/>
-                <a:cs typeface="Courier New" panose="02070309020205020404" pitchFamily="49" charset="0"/>
-              </a:rPr>
-              <a:t>()       // called only by </a:t>
-            </a:r>
-            <a:r>
-              <a:rPr lang="en-US" sz="1700" dirty="0" err="1">
-                <a:effectLst/>
-                <a:latin typeface="Consolas" panose="020B0609020204030204" pitchFamily="49" charset="0"/>
-                <a:ea typeface="Calibri" panose="020F0502020204030204" pitchFamily="34" charset="0"/>
-                <a:cs typeface="Courier New" panose="02070309020205020404" pitchFamily="49" charset="0"/>
-              </a:rPr>
-              <a:t>parseVariableCommon</a:t>
-            </a:r>
-            <a:r>
-              <a:rPr lang="en-US" sz="1700" dirty="0">
-                <a:effectLst/>
-                <a:latin typeface="Consolas" panose="020B0609020204030204" pitchFamily="49" charset="0"/>
-                <a:ea typeface="Calibri" panose="020F0502020204030204" pitchFamily="34" charset="0"/>
-                <a:cs typeface="Courier New" panose="02070309020205020404" pitchFamily="49" charset="0"/>
-              </a:rPr>
-              <a:t>()</a:t>
-            </a:r>
           </a:p>
           <a:p>
             <a:pPr marL="674370" lvl="1">

</xml_diff>